<commit_message>
Chap04: Correction of a picture
</commit_message>
<xml_diff>
--- a/04-CrMagOpt/Pictures/LinPol.pptx
+++ b/04-CrMagOpt/Pictures/LinPol.pptx
@@ -7,7 +7,7 @@
   <p:sldIdLst>
     <p:sldId id="256" r:id="rId2"/>
   </p:sldIdLst>
-  <p:sldSz cx="14222413" cy="9180513"/>
+  <p:sldSz cx="14222413" cy="9253538"/>
   <p:notesSz cx="6858000" cy="9144000"/>
   <p:defaultTextStyle>
     <a:defPPr>
@@ -136,8 +136,8 @@
         </p:nvSpPr>
         <p:spPr>
           <a:xfrm>
-            <a:off x="1066683" y="2851916"/>
-            <a:ext cx="12089051" cy="1967860"/>
+            <a:off x="1066685" y="2874602"/>
+            <a:ext cx="12089051" cy="1983513"/>
           </a:xfrm>
         </p:spPr>
         <p:txBody>
@@ -164,8 +164,8 @@
         </p:nvSpPr>
         <p:spPr>
           <a:xfrm>
-            <a:off x="2133365" y="5202296"/>
-            <a:ext cx="9955691" cy="2346132"/>
+            <a:off x="2133367" y="5243677"/>
+            <a:ext cx="9955691" cy="2364794"/>
           </a:xfrm>
         </p:spPr>
         <p:txBody>
@@ -548,8 +548,8 @@
         </p:nvSpPr>
         <p:spPr>
           <a:xfrm>
-            <a:off x="10311251" y="367654"/>
-            <a:ext cx="3200044" cy="7833187"/>
+            <a:off x="10311251" y="370579"/>
+            <a:ext cx="3200044" cy="7895495"/>
           </a:xfrm>
         </p:spPr>
         <p:txBody>
@@ -576,8 +576,8 @@
         </p:nvSpPr>
         <p:spPr>
           <a:xfrm>
-            <a:off x="711125" y="367654"/>
-            <a:ext cx="9363088" cy="7833187"/>
+            <a:off x="711125" y="370579"/>
+            <a:ext cx="9363088" cy="7895495"/>
           </a:xfrm>
         </p:spPr>
         <p:txBody>
@@ -898,8 +898,8 @@
         </p:nvSpPr>
         <p:spPr>
           <a:xfrm>
-            <a:off x="1123475" y="5899338"/>
-            <a:ext cx="12089051" cy="1823351"/>
+            <a:off x="1123477" y="5946264"/>
+            <a:ext cx="12089051" cy="1837855"/>
           </a:xfrm>
         </p:spPr>
         <p:txBody>
@@ -930,8 +930,8 @@
         </p:nvSpPr>
         <p:spPr>
           <a:xfrm>
-            <a:off x="1123475" y="3891100"/>
-            <a:ext cx="12089051" cy="2008237"/>
+            <a:off x="1123477" y="3922052"/>
+            <a:ext cx="12089051" cy="2024211"/>
           </a:xfrm>
         </p:spPr>
         <p:txBody>
@@ -1167,8 +1167,8 @@
         </p:nvSpPr>
         <p:spPr>
           <a:xfrm>
-            <a:off x="711123" y="2142131"/>
-            <a:ext cx="6281566" cy="6058715"/>
+            <a:off x="711123" y="2159171"/>
+            <a:ext cx="6281566" cy="6106908"/>
           </a:xfrm>
         </p:spPr>
         <p:txBody>
@@ -1252,8 +1252,8 @@
         </p:nvSpPr>
         <p:spPr>
           <a:xfrm>
-            <a:off x="7229730" y="2142131"/>
-            <a:ext cx="6281566" cy="6058715"/>
+            <a:off x="7229730" y="2159171"/>
+            <a:ext cx="6281566" cy="6106908"/>
           </a:xfrm>
         </p:spPr>
         <p:txBody>
@@ -1459,8 +1459,8 @@
         </p:nvSpPr>
         <p:spPr>
           <a:xfrm>
-            <a:off x="711123" y="2054995"/>
-            <a:ext cx="6284035" cy="856423"/>
+            <a:off x="711124" y="2071343"/>
+            <a:ext cx="6284035" cy="863235"/>
           </a:xfrm>
         </p:spPr>
         <p:txBody>
@@ -1524,8 +1524,8 @@
         </p:nvSpPr>
         <p:spPr>
           <a:xfrm>
-            <a:off x="711123" y="2911424"/>
-            <a:ext cx="6284035" cy="5289421"/>
+            <a:off x="711124" y="2934583"/>
+            <a:ext cx="6284035" cy="5331495"/>
           </a:xfrm>
         </p:spPr>
         <p:txBody>
@@ -1609,8 +1609,8 @@
         </p:nvSpPr>
         <p:spPr>
           <a:xfrm>
-            <a:off x="7224799" y="2054995"/>
-            <a:ext cx="6286505" cy="856423"/>
+            <a:off x="7224801" y="2071343"/>
+            <a:ext cx="6286505" cy="863235"/>
           </a:xfrm>
         </p:spPr>
         <p:txBody>
@@ -1674,8 +1674,8 @@
         </p:nvSpPr>
         <p:spPr>
           <a:xfrm>
-            <a:off x="7224799" y="2911424"/>
-            <a:ext cx="6286505" cy="5289421"/>
+            <a:off x="7224801" y="2934583"/>
+            <a:ext cx="6286505" cy="5331495"/>
           </a:xfrm>
         </p:spPr>
         <p:txBody>
@@ -2067,8 +2067,8 @@
         </p:nvSpPr>
         <p:spPr>
           <a:xfrm>
-            <a:off x="711125" y="365528"/>
-            <a:ext cx="4679076" cy="1555587"/>
+            <a:off x="711125" y="368436"/>
+            <a:ext cx="4679076" cy="1567961"/>
           </a:xfrm>
         </p:spPr>
         <p:txBody>
@@ -2099,8 +2099,8 @@
         </p:nvSpPr>
         <p:spPr>
           <a:xfrm>
-            <a:off x="5560570" y="365526"/>
-            <a:ext cx="7950723" cy="7835313"/>
+            <a:off x="5560572" y="368434"/>
+            <a:ext cx="7950723" cy="7897638"/>
           </a:xfrm>
         </p:spPr>
         <p:txBody>
@@ -2184,8 +2184,8 @@
         </p:nvSpPr>
         <p:spPr>
           <a:xfrm>
-            <a:off x="711125" y="1921115"/>
-            <a:ext cx="4679076" cy="6279725"/>
+            <a:off x="711125" y="1936397"/>
+            <a:ext cx="4679076" cy="6329676"/>
           </a:xfrm>
         </p:spPr>
         <p:txBody>
@@ -2344,8 +2344,8 @@
         </p:nvSpPr>
         <p:spPr>
           <a:xfrm>
-            <a:off x="2787702" y="6426367"/>
-            <a:ext cx="8533449" cy="758667"/>
+            <a:off x="2787704" y="6477485"/>
+            <a:ext cx="8533449" cy="764701"/>
           </a:xfrm>
         </p:spPr>
         <p:txBody>
@@ -2376,8 +2376,8 @@
         </p:nvSpPr>
         <p:spPr>
           <a:xfrm>
-            <a:off x="2787702" y="820300"/>
-            <a:ext cx="8533449" cy="5508308"/>
+            <a:off x="2787704" y="826826"/>
+            <a:ext cx="8533449" cy="5552123"/>
           </a:xfrm>
         </p:spPr>
         <p:txBody>
@@ -2437,8 +2437,8 @@
         </p:nvSpPr>
         <p:spPr>
           <a:xfrm>
-            <a:off x="2787702" y="7185028"/>
-            <a:ext cx="8533449" cy="1077436"/>
+            <a:off x="2787704" y="7242181"/>
+            <a:ext cx="8533449" cy="1086006"/>
           </a:xfrm>
         </p:spPr>
         <p:txBody>
@@ -2602,8 +2602,8 @@
         </p:nvSpPr>
         <p:spPr>
           <a:xfrm>
-            <a:off x="711124" y="367651"/>
-            <a:ext cx="12800170" cy="1530086"/>
+            <a:off x="711124" y="370575"/>
+            <a:ext cx="12800170" cy="1542257"/>
           </a:xfrm>
           <a:prstGeom prst="rect">
             <a:avLst/>
@@ -2635,8 +2635,8 @@
         </p:nvSpPr>
         <p:spPr>
           <a:xfrm>
-            <a:off x="711124" y="2142131"/>
-            <a:ext cx="12800170" cy="6058715"/>
+            <a:off x="711124" y="2159171"/>
+            <a:ext cx="12800170" cy="6106908"/>
           </a:xfrm>
           <a:prstGeom prst="rect">
             <a:avLst/>
@@ -2697,8 +2697,8 @@
         </p:nvSpPr>
         <p:spPr>
           <a:xfrm>
-            <a:off x="711122" y="8508978"/>
-            <a:ext cx="3318563" cy="488778"/>
+            <a:off x="711124" y="8576661"/>
+            <a:ext cx="3318563" cy="492666"/>
           </a:xfrm>
           <a:prstGeom prst="rect">
             <a:avLst/>
@@ -2738,8 +2738,8 @@
         </p:nvSpPr>
         <p:spPr>
           <a:xfrm>
-            <a:off x="4859327" y="8508978"/>
-            <a:ext cx="4503765" cy="488778"/>
+            <a:off x="4859329" y="8576661"/>
+            <a:ext cx="4503765" cy="492666"/>
           </a:xfrm>
           <a:prstGeom prst="rect">
             <a:avLst/>
@@ -2775,8 +2775,8 @@
         </p:nvSpPr>
         <p:spPr>
           <a:xfrm>
-            <a:off x="10192737" y="8508978"/>
-            <a:ext cx="3318563" cy="488778"/>
+            <a:off x="10192739" y="8576661"/>
+            <a:ext cx="3318563" cy="492666"/>
           </a:xfrm>
           <a:prstGeom prst="rect">
             <a:avLst/>
@@ -3097,7 +3097,7 @@
       </p:grpSpPr>
       <p:pic>
         <p:nvPicPr>
-          <p:cNvPr id="241" name="Picture 2"/>
+          <p:cNvPr id="108" name="Picture 2"/>
           <p:cNvPicPr>
             <a:picLocks noChangeAspect="1" noChangeArrowheads="1"/>
           </p:cNvPicPr>
@@ -3118,7 +3118,7 @@
         </p:blipFill>
         <p:spPr bwMode="auto">
           <a:xfrm>
-            <a:off x="262798" y="-90264"/>
+            <a:off x="262798" y="-15169"/>
             <a:ext cx="8839462" cy="5760000"/>
           </a:xfrm>
           <a:prstGeom prst="rect">
@@ -3161,7 +3161,7 @@
       </p:pic>
       <p:pic>
         <p:nvPicPr>
-          <p:cNvPr id="242" name="Picture 3"/>
+          <p:cNvPr id="109" name="Picture 3"/>
           <p:cNvPicPr>
             <a:picLocks noChangeAspect="1" noChangeArrowheads="1"/>
           </p:cNvPicPr>
@@ -3182,7 +3182,7 @@
         </p:blipFill>
         <p:spPr bwMode="auto">
           <a:xfrm>
-            <a:off x="-126000" y="5094307"/>
+            <a:off x="-126000" y="5169402"/>
             <a:ext cx="9360000" cy="4101374"/>
           </a:xfrm>
           <a:prstGeom prst="rect">
@@ -3225,7 +3225,7 @@
       </p:pic>
       <p:grpSp>
         <p:nvGrpSpPr>
-          <p:cNvPr id="243" name="Groupe 242"/>
+          <p:cNvPr id="110" name="Groupe 109"/>
           <p:cNvGrpSpPr>
             <a:grpSpLocks noChangeAspect="1"/>
           </p:cNvGrpSpPr>
@@ -3233,7 +3233,7 @@
         </p:nvGrpSpPr>
         <p:grpSpPr>
           <a:xfrm>
-            <a:off x="8838561" y="125759"/>
+            <a:off x="8838561" y="200854"/>
             <a:ext cx="5588132" cy="8784000"/>
             <a:chOff x="3317185" y="361215"/>
             <a:chExt cx="3365951" cy="5290905"/>
@@ -3241,7 +3241,7 @@
         </p:grpSpPr>
         <p:sp>
           <p:nvSpPr>
-            <p:cNvPr id="244" name="Line 2"/>
+            <p:cNvPr id="111" name="Line 2"/>
             <p:cNvSpPr>
               <a:spLocks noChangeShapeType="1"/>
             </p:cNvSpPr>
@@ -3292,7 +3292,7 @@
         </p:sp>
         <p:sp>
           <p:nvSpPr>
-            <p:cNvPr id="245" name="Line 4"/>
+            <p:cNvPr id="112" name="Line 4"/>
             <p:cNvSpPr>
               <a:spLocks noChangeShapeType="1"/>
             </p:cNvSpPr>
@@ -3343,7 +3343,7 @@
         </p:sp>
         <p:sp>
           <p:nvSpPr>
-            <p:cNvPr id="246" name="Rectangle 6"/>
+            <p:cNvPr id="113" name="Rectangle 6"/>
             <p:cNvSpPr>
               <a:spLocks noChangeArrowheads="1"/>
             </p:cNvSpPr>
@@ -3419,7 +3419,7 @@
         </p:sp>
         <p:sp>
           <p:nvSpPr>
-            <p:cNvPr id="247" name="Line 10"/>
+            <p:cNvPr id="114" name="Line 10"/>
             <p:cNvSpPr>
               <a:spLocks noChangeShapeType="1"/>
             </p:cNvSpPr>
@@ -3470,7 +3470,7 @@
         </p:sp>
         <p:sp>
           <p:nvSpPr>
-            <p:cNvPr id="248" name="Rectangle 11"/>
+            <p:cNvPr id="115" name="Rectangle 11"/>
             <p:cNvSpPr>
               <a:spLocks noChangeArrowheads="1"/>
             </p:cNvSpPr>
@@ -3550,7 +3550,7 @@
         </p:sp>
         <p:sp>
           <p:nvSpPr>
-            <p:cNvPr id="249" name="AutoShape 12"/>
+            <p:cNvPr id="116" name="AutoShape 12"/>
             <p:cNvSpPr>
               <a:spLocks/>
             </p:cNvSpPr>
@@ -3737,7 +3737,7 @@
         </p:sp>
         <p:sp>
           <p:nvSpPr>
-            <p:cNvPr id="250" name="Line 34"/>
+            <p:cNvPr id="117" name="Line 34"/>
             <p:cNvSpPr>
               <a:spLocks noChangeShapeType="1"/>
             </p:cNvSpPr>
@@ -3788,7 +3788,7 @@
         </p:sp>
         <p:sp>
           <p:nvSpPr>
-            <p:cNvPr id="251" name="Line 35"/>
+            <p:cNvPr id="118" name="Line 35"/>
             <p:cNvSpPr>
               <a:spLocks noChangeShapeType="1"/>
             </p:cNvSpPr>
@@ -3840,7 +3840,7 @@
         </p:sp>
         <p:sp>
           <p:nvSpPr>
-            <p:cNvPr id="252" name="Line 38"/>
+            <p:cNvPr id="119" name="Line 38"/>
             <p:cNvSpPr>
               <a:spLocks noChangeShapeType="1"/>
             </p:cNvSpPr>
@@ -3892,7 +3892,7 @@
         </p:sp>
         <p:sp>
           <p:nvSpPr>
-            <p:cNvPr id="253" name="Line 39"/>
+            <p:cNvPr id="120" name="Line 39"/>
             <p:cNvSpPr>
               <a:spLocks noChangeShapeType="1"/>
             </p:cNvSpPr>
@@ -3944,7 +3944,7 @@
         </p:sp>
         <p:sp>
           <p:nvSpPr>
-            <p:cNvPr id="254" name="Rectangle 40"/>
+            <p:cNvPr id="121" name="Rectangle 40"/>
             <p:cNvSpPr>
               <a:spLocks noChangeArrowheads="1"/>
             </p:cNvSpPr>
@@ -4024,7 +4024,7 @@
         </p:sp>
         <p:sp>
           <p:nvSpPr>
-            <p:cNvPr id="255" name="Line 52"/>
+            <p:cNvPr id="122" name="Line 52"/>
             <p:cNvSpPr>
               <a:spLocks noChangeShapeType="1"/>
             </p:cNvSpPr>
@@ -4066,7 +4066,7 @@
         </p:sp>
         <p:sp>
           <p:nvSpPr>
-            <p:cNvPr id="256" name="Line 53"/>
+            <p:cNvPr id="123" name="Line 53"/>
             <p:cNvSpPr>
               <a:spLocks noChangeShapeType="1"/>
             </p:cNvSpPr>
@@ -4108,7 +4108,7 @@
         </p:sp>
         <p:sp>
           <p:nvSpPr>
-            <p:cNvPr id="257" name="Line 54"/>
+            <p:cNvPr id="124" name="Line 54"/>
             <p:cNvSpPr>
               <a:spLocks noChangeShapeType="1"/>
             </p:cNvSpPr>
@@ -4150,7 +4150,7 @@
         </p:sp>
         <p:sp>
           <p:nvSpPr>
-            <p:cNvPr id="258" name="Line 58"/>
+            <p:cNvPr id="125" name="Line 58"/>
             <p:cNvSpPr>
               <a:spLocks noChangeShapeType="1"/>
             </p:cNvSpPr>
@@ -4192,7 +4192,7 @@
         </p:sp>
         <p:sp>
           <p:nvSpPr>
-            <p:cNvPr id="259" name="Line 59"/>
+            <p:cNvPr id="126" name="Line 59"/>
             <p:cNvSpPr>
               <a:spLocks noChangeShapeType="1"/>
             </p:cNvSpPr>
@@ -4234,7 +4234,7 @@
         </p:sp>
         <p:sp>
           <p:nvSpPr>
-            <p:cNvPr id="260" name="Line 60"/>
+            <p:cNvPr id="127" name="Line 60"/>
             <p:cNvSpPr>
               <a:spLocks noChangeShapeType="1"/>
             </p:cNvSpPr>
@@ -4276,7 +4276,7 @@
         </p:sp>
         <p:sp>
           <p:nvSpPr>
-            <p:cNvPr id="261" name="Line 67"/>
+            <p:cNvPr id="128" name="Line 67"/>
             <p:cNvSpPr>
               <a:spLocks noChangeShapeType="1"/>
             </p:cNvSpPr>
@@ -4328,7 +4328,7 @@
         </p:sp>
         <p:sp>
           <p:nvSpPr>
-            <p:cNvPr id="262" name="Rectangle 71"/>
+            <p:cNvPr id="129" name="Rectangle 71"/>
             <p:cNvSpPr>
               <a:spLocks noChangeArrowheads="1"/>
             </p:cNvSpPr>
@@ -4410,7 +4410,7 @@
         </p:sp>
         <p:sp>
           <p:nvSpPr>
-            <p:cNvPr id="263" name="Rectangle 72"/>
+            <p:cNvPr id="130" name="Rectangle 72"/>
             <p:cNvSpPr>
               <a:spLocks noChangeArrowheads="1"/>
             </p:cNvSpPr>
@@ -4486,7 +4486,7 @@
         </p:sp>
         <p:sp>
           <p:nvSpPr>
-            <p:cNvPr id="264" name="Line 3"/>
+            <p:cNvPr id="131" name="Line 3"/>
             <p:cNvSpPr>
               <a:spLocks noChangeShapeType="1"/>
             </p:cNvSpPr>
@@ -4537,7 +4537,7 @@
         </p:sp>
         <p:sp>
           <p:nvSpPr>
-            <p:cNvPr id="265" name="Forme libre 10"/>
+            <p:cNvPr id="132" name="Forme libre 10"/>
             <p:cNvSpPr>
               <a:spLocks/>
             </p:cNvSpPr>
@@ -4633,7 +4633,7 @@
         </p:sp>
         <p:sp>
           <p:nvSpPr>
-            <p:cNvPr id="266" name="Forme libre 11"/>
+            <p:cNvPr id="133" name="Forme libre 11"/>
             <p:cNvSpPr>
               <a:spLocks/>
             </p:cNvSpPr>
@@ -4729,7 +4729,7 @@
         </p:sp>
         <p:sp>
           <p:nvSpPr>
-            <p:cNvPr id="267" name="Rectangle 25"/>
+            <p:cNvPr id="134" name="Rectangle 25"/>
             <p:cNvSpPr>
               <a:spLocks noChangeArrowheads="1"/>
             </p:cNvSpPr>
@@ -4821,7 +4821,7 @@
         </p:sp>
         <p:sp>
           <p:nvSpPr>
-            <p:cNvPr id="268" name="Line 10"/>
+            <p:cNvPr id="135" name="Line 10"/>
             <p:cNvSpPr>
               <a:spLocks noChangeShapeType="1"/>
             </p:cNvSpPr>
@@ -4872,7 +4872,7 @@
         </p:sp>
         <p:sp>
           <p:nvSpPr>
-            <p:cNvPr id="269" name="Rectangle 11"/>
+            <p:cNvPr id="136" name="Rectangle 11"/>
             <p:cNvSpPr>
               <a:spLocks noChangeArrowheads="1"/>
             </p:cNvSpPr>
@@ -4967,7 +4967,7 @@
         </p:sp>
         <p:sp>
           <p:nvSpPr>
-            <p:cNvPr id="270" name="Rectangle 24"/>
+            <p:cNvPr id="137" name="Rectangle 24"/>
             <p:cNvSpPr>
               <a:spLocks noChangeArrowheads="1"/>
             </p:cNvSpPr>
@@ -5044,7 +5044,7 @@
         </p:sp>
         <p:cxnSp>
           <p:nvCxnSpPr>
-            <p:cNvPr id="271" name="Connecteur droit avec flèche 270"/>
+            <p:cNvPr id="138" name="Connecteur droit avec flèche 137"/>
             <p:cNvCxnSpPr/>
             <p:nvPr/>
           </p:nvCxnSpPr>
@@ -5083,7 +5083,7 @@
         </p:cxnSp>
         <p:cxnSp>
           <p:nvCxnSpPr>
-            <p:cNvPr id="272" name="Connecteur droit avec flèche 271"/>
+            <p:cNvPr id="139" name="Connecteur droit avec flèche 138"/>
             <p:cNvCxnSpPr/>
             <p:nvPr/>
           </p:nvCxnSpPr>
@@ -5119,7 +5119,7 @@
         </p:cxnSp>
         <p:sp>
           <p:nvSpPr>
-            <p:cNvPr id="273" name="Rectangle 25"/>
+            <p:cNvPr id="140" name="Rectangle 25"/>
             <p:cNvSpPr>
               <a:spLocks noChangeArrowheads="1"/>
             </p:cNvSpPr>
@@ -5199,7 +5199,7 @@
         </p:sp>
         <p:sp>
           <p:nvSpPr>
-            <p:cNvPr id="274" name="ZoneTexte 273"/>
+            <p:cNvPr id="141" name="ZoneTexte 140"/>
             <p:cNvSpPr txBox="1"/>
             <p:nvPr/>
           </p:nvSpPr>
@@ -5242,7 +5242,7 @@
         </p:sp>
         <p:sp>
           <p:nvSpPr>
-            <p:cNvPr id="275" name="ZoneTexte 274"/>
+            <p:cNvPr id="142" name="ZoneTexte 141"/>
             <p:cNvSpPr txBox="1"/>
             <p:nvPr/>
           </p:nvSpPr>
@@ -5278,7 +5278,7 @@
         </p:sp>
         <p:sp>
           <p:nvSpPr>
-            <p:cNvPr id="276" name="Rectangle 13"/>
+            <p:cNvPr id="143" name="Rectangle 13"/>
             <p:cNvSpPr>
               <a:spLocks noChangeArrowheads="1"/>
             </p:cNvSpPr>
@@ -5361,7 +5361,7 @@
         </p:sp>
         <p:sp>
           <p:nvSpPr>
-            <p:cNvPr id="277" name="Rectangle 73"/>
+            <p:cNvPr id="144" name="Rectangle 73"/>
             <p:cNvSpPr>
               <a:spLocks noChangeArrowheads="1"/>
             </p:cNvSpPr>
@@ -5438,7 +5438,7 @@
         </p:sp>
         <p:sp>
           <p:nvSpPr>
-            <p:cNvPr id="278" name="Accolade ouvrante 277"/>
+            <p:cNvPr id="145" name="Accolade ouvrante 144"/>
             <p:cNvSpPr/>
             <p:nvPr/>
           </p:nvSpPr>
@@ -5476,7 +5476,7 @@
         </p:sp>
         <p:sp>
           <p:nvSpPr>
-            <p:cNvPr id="279" name="Accolade ouvrante 278"/>
+            <p:cNvPr id="146" name="Accolade ouvrante 145"/>
             <p:cNvSpPr/>
             <p:nvPr/>
           </p:nvSpPr>
@@ -5514,7 +5514,7 @@
         </p:sp>
         <p:sp>
           <p:nvSpPr>
-            <p:cNvPr id="280" name="Rectangle 279"/>
+            <p:cNvPr id="147" name="Rectangle 146"/>
             <p:cNvSpPr/>
             <p:nvPr/>
           </p:nvSpPr>
@@ -5562,7 +5562,7 @@
         </p:sp>
         <p:sp>
           <p:nvSpPr>
-            <p:cNvPr id="281" name="AutoShape 12"/>
+            <p:cNvPr id="148" name="AutoShape 12"/>
             <p:cNvSpPr>
               <a:spLocks/>
             </p:cNvSpPr>
@@ -5749,7 +5749,7 @@
         </p:sp>
         <p:cxnSp>
           <p:nvCxnSpPr>
-            <p:cNvPr id="282" name="Connecteur droit avec flèche 281"/>
+            <p:cNvPr id="149" name="Connecteur droit avec flèche 148"/>
             <p:cNvCxnSpPr/>
             <p:nvPr/>
           </p:nvCxnSpPr>
@@ -5785,7 +5785,7 @@
         </p:cxnSp>
         <p:cxnSp>
           <p:nvCxnSpPr>
-            <p:cNvPr id="283" name="Connecteur droit avec flèche 282"/>
+            <p:cNvPr id="150" name="Connecteur droit avec flèche 149"/>
             <p:cNvCxnSpPr/>
             <p:nvPr/>
           </p:nvCxnSpPr>
@@ -5821,7 +5821,7 @@
         </p:cxnSp>
         <p:cxnSp>
           <p:nvCxnSpPr>
-            <p:cNvPr id="284" name="Connecteur droit avec flèche 283"/>
+            <p:cNvPr id="151" name="Connecteur droit avec flèche 150"/>
             <p:cNvCxnSpPr/>
             <p:nvPr/>
           </p:nvCxnSpPr>
@@ -5857,7 +5857,7 @@
         </p:cxnSp>
         <p:cxnSp>
           <p:nvCxnSpPr>
-            <p:cNvPr id="285" name="Connecteur droit avec flèche 284"/>
+            <p:cNvPr id="152" name="Connecteur droit avec flèche 151"/>
             <p:cNvCxnSpPr/>
             <p:nvPr/>
           </p:nvCxnSpPr>
@@ -5896,7 +5896,7 @@
         </p:cxnSp>
         <p:sp>
           <p:nvSpPr>
-            <p:cNvPr id="286" name="Line 39"/>
+            <p:cNvPr id="153" name="Line 39"/>
             <p:cNvSpPr>
               <a:spLocks noChangeShapeType="1"/>
             </p:cNvSpPr>
@@ -5948,7 +5948,7 @@
         </p:sp>
         <p:sp>
           <p:nvSpPr>
-            <p:cNvPr id="287" name="Line 39"/>
+            <p:cNvPr id="154" name="Line 39"/>
             <p:cNvSpPr>
               <a:spLocks noChangeShapeType="1"/>
             </p:cNvSpPr>
@@ -6000,7 +6000,7 @@
         </p:sp>
         <p:sp>
           <p:nvSpPr>
-            <p:cNvPr id="288" name="Rectangle 11"/>
+            <p:cNvPr id="155" name="Rectangle 11"/>
             <p:cNvSpPr>
               <a:spLocks noChangeArrowheads="1"/>
             </p:cNvSpPr>
@@ -6106,7 +6106,7 @@
         </p:sp>
         <p:sp>
           <p:nvSpPr>
-            <p:cNvPr id="289" name="Rectangle 11"/>
+            <p:cNvPr id="156" name="Rectangle 11"/>
             <p:cNvSpPr>
               <a:spLocks noChangeArrowheads="1"/>
             </p:cNvSpPr>
@@ -6204,13 +6204,13 @@
       </p:grpSp>
       <p:sp>
         <p:nvSpPr>
-          <p:cNvPr id="290" name="ZoneTexte 289"/>
+          <p:cNvPr id="157" name="ZoneTexte 156"/>
           <p:cNvSpPr txBox="1"/>
           <p:nvPr/>
         </p:nvSpPr>
         <p:spPr>
           <a:xfrm>
-            <a:off x="968253" y="125760"/>
+            <a:off x="968253" y="200855"/>
             <a:ext cx="526106" cy="461665"/>
           </a:xfrm>
           <a:prstGeom prst="rect">
@@ -6240,13 +6240,13 @@
       </p:sp>
       <p:sp>
         <p:nvSpPr>
-          <p:cNvPr id="291" name="ZoneTexte 290"/>
+          <p:cNvPr id="158" name="ZoneTexte 157"/>
           <p:cNvSpPr txBox="1"/>
           <p:nvPr/>
         </p:nvSpPr>
         <p:spPr>
           <a:xfrm>
-            <a:off x="9127430" y="54000"/>
+            <a:off x="9127430" y="129095"/>
             <a:ext cx="526106" cy="461665"/>
           </a:xfrm>
           <a:prstGeom prst="rect">
@@ -6276,13 +6276,13 @@
       </p:sp>
       <p:sp>
         <p:nvSpPr>
-          <p:cNvPr id="292" name="ZoneTexte 291"/>
+          <p:cNvPr id="159" name="ZoneTexte 158"/>
           <p:cNvSpPr txBox="1"/>
           <p:nvPr/>
         </p:nvSpPr>
         <p:spPr>
           <a:xfrm>
-            <a:off x="1062311" y="5382344"/>
+            <a:off x="1062311" y="5457439"/>
             <a:ext cx="543739" cy="461665"/>
           </a:xfrm>
           <a:prstGeom prst="rect">
@@ -6318,13 +6318,13 @@
       </p:sp>
       <p:sp>
         <p:nvSpPr>
-          <p:cNvPr id="293" name="Rectangle 292"/>
+          <p:cNvPr id="160" name="Rectangle 159"/>
           <p:cNvSpPr/>
           <p:nvPr/>
         </p:nvSpPr>
         <p:spPr>
           <a:xfrm>
-            <a:off x="8838561" y="-18256"/>
+            <a:off x="8838561" y="56839"/>
             <a:ext cx="5310827" cy="9073008"/>
           </a:xfrm>
           <a:prstGeom prst="rect">

</xml_diff>

<commit_message>
Chap04: Correction Lucien finished
</commit_message>
<xml_diff>
--- a/04-CrMagOpt/Pictures/LinPol.pptx
+++ b/04-CrMagOpt/Pictures/LinPol.pptx
@@ -288,7 +288,7 @@
           <a:p>
             <a:fld id="{5179894F-6662-4CC5-BBF7-E348DEE069B2}" type="datetimeFigureOut">
               <a:rPr lang="fr-FR" smtClean="0"/>
-              <a:t>31/10/2017</a:t>
+              <a:t>09/11/2017</a:t>
             </a:fld>
             <a:endParaRPr lang="fr-FR"/>
           </a:p>
@@ -458,7 +458,7 @@
           <a:p>
             <a:fld id="{5179894F-6662-4CC5-BBF7-E348DEE069B2}" type="datetimeFigureOut">
               <a:rPr lang="fr-FR" smtClean="0"/>
-              <a:t>31/10/2017</a:t>
+              <a:t>09/11/2017</a:t>
             </a:fld>
             <a:endParaRPr lang="fr-FR"/>
           </a:p>
@@ -638,7 +638,7 @@
           <a:p>
             <a:fld id="{5179894F-6662-4CC5-BBF7-E348DEE069B2}" type="datetimeFigureOut">
               <a:rPr lang="fr-FR" smtClean="0"/>
-              <a:t>31/10/2017</a:t>
+              <a:t>09/11/2017</a:t>
             </a:fld>
             <a:endParaRPr lang="fr-FR"/>
           </a:p>
@@ -808,7 +808,7 @@
           <a:p>
             <a:fld id="{5179894F-6662-4CC5-BBF7-E348DEE069B2}" type="datetimeFigureOut">
               <a:rPr lang="fr-FR" smtClean="0"/>
-              <a:t>31/10/2017</a:t>
+              <a:t>09/11/2017</a:t>
             </a:fld>
             <a:endParaRPr lang="fr-FR"/>
           </a:p>
@@ -1054,7 +1054,7 @@
           <a:p>
             <a:fld id="{5179894F-6662-4CC5-BBF7-E348DEE069B2}" type="datetimeFigureOut">
               <a:rPr lang="fr-FR" smtClean="0"/>
-              <a:t>31/10/2017</a:t>
+              <a:t>09/11/2017</a:t>
             </a:fld>
             <a:endParaRPr lang="fr-FR"/>
           </a:p>
@@ -1342,7 +1342,7 @@
           <a:p>
             <a:fld id="{5179894F-6662-4CC5-BBF7-E348DEE069B2}" type="datetimeFigureOut">
               <a:rPr lang="fr-FR" smtClean="0"/>
-              <a:t>31/10/2017</a:t>
+              <a:t>09/11/2017</a:t>
             </a:fld>
             <a:endParaRPr lang="fr-FR"/>
           </a:p>
@@ -1764,7 +1764,7 @@
           <a:p>
             <a:fld id="{5179894F-6662-4CC5-BBF7-E348DEE069B2}" type="datetimeFigureOut">
               <a:rPr lang="fr-FR" smtClean="0"/>
-              <a:t>31/10/2017</a:t>
+              <a:t>09/11/2017</a:t>
             </a:fld>
             <a:endParaRPr lang="fr-FR"/>
           </a:p>
@@ -1882,7 +1882,7 @@
           <a:p>
             <a:fld id="{5179894F-6662-4CC5-BBF7-E348DEE069B2}" type="datetimeFigureOut">
               <a:rPr lang="fr-FR" smtClean="0"/>
-              <a:t>31/10/2017</a:t>
+              <a:t>09/11/2017</a:t>
             </a:fld>
             <a:endParaRPr lang="fr-FR"/>
           </a:p>
@@ -1977,7 +1977,7 @@
           <a:p>
             <a:fld id="{5179894F-6662-4CC5-BBF7-E348DEE069B2}" type="datetimeFigureOut">
               <a:rPr lang="fr-FR" smtClean="0"/>
-              <a:t>31/10/2017</a:t>
+              <a:t>09/11/2017</a:t>
             </a:fld>
             <a:endParaRPr lang="fr-FR"/>
           </a:p>
@@ -2254,7 +2254,7 @@
           <a:p>
             <a:fld id="{5179894F-6662-4CC5-BBF7-E348DEE069B2}" type="datetimeFigureOut">
               <a:rPr lang="fr-FR" smtClean="0"/>
-              <a:t>31/10/2017</a:t>
+              <a:t>09/11/2017</a:t>
             </a:fld>
             <a:endParaRPr lang="fr-FR"/>
           </a:p>
@@ -2507,7 +2507,7 @@
           <a:p>
             <a:fld id="{5179894F-6662-4CC5-BBF7-E348DEE069B2}" type="datetimeFigureOut">
               <a:rPr lang="fr-FR" smtClean="0"/>
-              <a:t>31/10/2017</a:t>
+              <a:t>09/11/2017</a:t>
             </a:fld>
             <a:endParaRPr lang="fr-FR"/>
           </a:p>
@@ -2720,7 +2720,7 @@
           <a:p>
             <a:fld id="{5179894F-6662-4CC5-BBF7-E348DEE069B2}" type="datetimeFigureOut">
               <a:rPr lang="fr-FR" smtClean="0"/>
-              <a:t>31/10/2017</a:t>
+              <a:t>09/11/2017</a:t>
             </a:fld>
             <a:endParaRPr lang="fr-FR"/>
           </a:p>
@@ -3118,7 +3118,7 @@
         </p:blipFill>
         <p:spPr bwMode="auto">
           <a:xfrm>
-            <a:off x="262798" y="-15169"/>
+            <a:off x="262798" y="-53751"/>
             <a:ext cx="8839462" cy="5760000"/>
           </a:xfrm>
           <a:prstGeom prst="rect">
@@ -3182,7 +3182,7 @@
         </p:blipFill>
         <p:spPr bwMode="auto">
           <a:xfrm>
-            <a:off x="-126000" y="5169402"/>
+            <a:off x="-126000" y="5130820"/>
             <a:ext cx="9360000" cy="4101374"/>
           </a:xfrm>
           <a:prstGeom prst="rect">
@@ -3233,7 +3233,7 @@
         </p:nvGrpSpPr>
         <p:grpSpPr>
           <a:xfrm>
-            <a:off x="8838561" y="200854"/>
+            <a:off x="8838561" y="162272"/>
             <a:ext cx="5588132" cy="8784000"/>
             <a:chOff x="3317185" y="361215"/>
             <a:chExt cx="3365951" cy="5290905"/>
@@ -6210,7 +6210,7 @@
         </p:nvSpPr>
         <p:spPr>
           <a:xfrm>
-            <a:off x="968253" y="200855"/>
+            <a:off x="968253" y="162273"/>
             <a:ext cx="526106" cy="461665"/>
           </a:xfrm>
           <a:prstGeom prst="rect">
@@ -6246,7 +6246,7 @@
         </p:nvSpPr>
         <p:spPr>
           <a:xfrm>
-            <a:off x="9127430" y="129095"/>
+            <a:off x="9127430" y="166618"/>
             <a:ext cx="526106" cy="461665"/>
           </a:xfrm>
           <a:prstGeom prst="rect">
@@ -6282,7 +6282,7 @@
         </p:nvSpPr>
         <p:spPr>
           <a:xfrm>
-            <a:off x="1062311" y="5457439"/>
+            <a:off x="1062311" y="5418857"/>
             <a:ext cx="543739" cy="461665"/>
           </a:xfrm>
           <a:prstGeom prst="rect">
@@ -6324,8 +6324,8 @@
         </p:nvSpPr>
         <p:spPr>
           <a:xfrm>
-            <a:off x="8838561" y="56839"/>
-            <a:ext cx="5310827" cy="9073008"/>
+            <a:off x="8838561" y="195699"/>
+            <a:ext cx="5310827" cy="8895566"/>
           </a:xfrm>
           <a:prstGeom prst="rect">
             <a:avLst/>

</xml_diff>